<commit_message>
Added assignment and updated the slides
</commit_message>
<xml_diff>
--- a/slides/Classification + Regression.pptx
+++ b/slides/Classification + Regression.pptx
@@ -287,7 +287,7 @@
             <a:fld id="{14F63557-65CD-470F-8999-4C3C411BE899}" type="datetimeFigureOut">
               <a:rPr lang="en-GB" smtClean="0"/>
               <a:pPr/>
-              <a:t>19/03/2023</a:t>
+              <a:t>28/03/2024</a:t>
             </a:fld>
             <a:endParaRPr lang="en-GB"/>
           </a:p>
@@ -906,7 +906,7 @@
         <p:spPr>
           <a:xfrm>
             <a:off x="619545" y="4749146"/>
-            <a:ext cx="900888" cy="123111"/>
+            <a:ext cx="65" cy="123111"/>
           </a:xfrm>
           <a:prstGeom prst="rect">
             <a:avLst/>
@@ -919,23 +919,20 @@
           </a:bodyPr>
           <a:lstStyle/>
           <a:p>
-            <a:r>
-              <a:rPr kumimoji="0" lang="en-GB" sz="800" b="0" i="0" u="none" strike="noStrike" kern="1200" cap="none" spc="0" normalizeH="0" baseline="0" dirty="0">
-                <a:ln>
-                  <a:noFill/>
-                </a:ln>
-                <a:solidFill>
-                  <a:schemeClr val="bg2"/>
-                </a:solidFill>
-                <a:effectLst/>
-                <a:uLnTx/>
-                <a:uFillTx/>
-                <a:latin typeface="Helvetica 75 Bold" panose="020B0804020202020204" pitchFamily="34" charset="0"/>
-                <a:ea typeface="+mn-ea"/>
-                <a:cs typeface="+mn-cs"/>
-              </a:rPr>
-              <a:t>Orange Restricted</a:t>
-            </a:r>
+            <a:endParaRPr kumimoji="0" lang="en-GB" sz="800" b="0" i="0" u="none" strike="noStrike" kern="1200" cap="none" spc="0" normalizeH="0" baseline="0" dirty="0">
+              <a:ln>
+                <a:noFill/>
+              </a:ln>
+              <a:solidFill>
+                <a:schemeClr val="bg2"/>
+              </a:solidFill>
+              <a:effectLst/>
+              <a:uLnTx/>
+              <a:uFillTx/>
+              <a:latin typeface="Helvetica 75 Bold" panose="020B0804020202020204" pitchFamily="34" charset="0"/>
+              <a:ea typeface="+mn-ea"/>
+              <a:cs typeface="+mn-cs"/>
+            </a:endParaRPr>
           </a:p>
         </p:txBody>
       </p:sp>
@@ -2811,7 +2808,7 @@
         <p:spPr>
           <a:xfrm>
             <a:off x="619545" y="4749146"/>
-            <a:ext cx="900888" cy="123111"/>
+            <a:ext cx="65" cy="123111"/>
           </a:xfrm>
           <a:prstGeom prst="rect">
             <a:avLst/>
@@ -2824,23 +2821,20 @@
           </a:bodyPr>
           <a:lstStyle/>
           <a:p>
-            <a:r>
-              <a:rPr kumimoji="0" lang="en-GB" sz="800" b="0" i="0" u="none" strike="noStrike" kern="1200" cap="none" spc="0" normalizeH="0" baseline="0" dirty="0">
-                <a:ln>
-                  <a:noFill/>
-                </a:ln>
-                <a:solidFill>
-                  <a:schemeClr val="bg2"/>
-                </a:solidFill>
-                <a:effectLst/>
-                <a:uLnTx/>
-                <a:uFillTx/>
-                <a:latin typeface="Helvetica 75 Bold" panose="020B0804020202020204" pitchFamily="34" charset="0"/>
-                <a:ea typeface="+mn-ea"/>
-                <a:cs typeface="+mn-cs"/>
-              </a:rPr>
-              <a:t>Orange Restricted</a:t>
-            </a:r>
+            <a:endParaRPr kumimoji="0" lang="en-GB" sz="800" b="0" i="0" u="none" strike="noStrike" kern="1200" cap="none" spc="0" normalizeH="0" baseline="0" dirty="0">
+              <a:ln>
+                <a:noFill/>
+              </a:ln>
+              <a:solidFill>
+                <a:schemeClr val="bg2"/>
+              </a:solidFill>
+              <a:effectLst/>
+              <a:uLnTx/>
+              <a:uFillTx/>
+              <a:latin typeface="Helvetica 75 Bold" panose="020B0804020202020204" pitchFamily="34" charset="0"/>
+              <a:ea typeface="+mn-ea"/>
+              <a:cs typeface="+mn-cs"/>
+            </a:endParaRPr>
           </a:p>
         </p:txBody>
       </p:sp>
@@ -2961,7 +2955,7 @@
         <p:spPr>
           <a:xfrm>
             <a:off x="619545" y="4749146"/>
-            <a:ext cx="900888" cy="123111"/>
+            <a:ext cx="65" cy="123111"/>
           </a:xfrm>
           <a:prstGeom prst="rect">
             <a:avLst/>
@@ -2974,23 +2968,20 @@
           </a:bodyPr>
           <a:lstStyle/>
           <a:p>
-            <a:r>
-              <a:rPr kumimoji="0" lang="en-GB" sz="800" b="0" i="0" u="none" strike="noStrike" kern="1200" cap="none" spc="0" normalizeH="0" baseline="0" dirty="0">
-                <a:ln>
-                  <a:noFill/>
-                </a:ln>
-                <a:solidFill>
-                  <a:schemeClr val="bg2"/>
-                </a:solidFill>
-                <a:effectLst/>
-                <a:uLnTx/>
-                <a:uFillTx/>
-                <a:latin typeface="Helvetica 75 Bold" panose="020B0804020202020204" pitchFamily="34" charset="0"/>
-                <a:ea typeface="+mn-ea"/>
-                <a:cs typeface="+mn-cs"/>
-              </a:rPr>
-              <a:t>Orange Restricted</a:t>
-            </a:r>
+            <a:endParaRPr kumimoji="0" lang="en-GB" sz="800" b="0" i="0" u="none" strike="noStrike" kern="1200" cap="none" spc="0" normalizeH="0" baseline="0" dirty="0">
+              <a:ln>
+                <a:noFill/>
+              </a:ln>
+              <a:solidFill>
+                <a:schemeClr val="bg2"/>
+              </a:solidFill>
+              <a:effectLst/>
+              <a:uLnTx/>
+              <a:uFillTx/>
+              <a:latin typeface="Helvetica 75 Bold" panose="020B0804020202020204" pitchFamily="34" charset="0"/>
+              <a:ea typeface="+mn-ea"/>
+              <a:cs typeface="+mn-cs"/>
+            </a:endParaRPr>
           </a:p>
         </p:txBody>
       </p:sp>
@@ -3297,7 +3288,7 @@
         <p:spPr>
           <a:xfrm>
             <a:off x="619545" y="4749146"/>
-            <a:ext cx="900888" cy="123111"/>
+            <a:ext cx="65" cy="123111"/>
           </a:xfrm>
           <a:prstGeom prst="rect">
             <a:avLst/>
@@ -3310,23 +3301,20 @@
           </a:bodyPr>
           <a:lstStyle/>
           <a:p>
-            <a:r>
-              <a:rPr kumimoji="0" lang="en-GB" sz="800" b="0" i="0" u="none" strike="noStrike" kern="1200" cap="none" spc="0" normalizeH="0" baseline="0" dirty="0">
-                <a:ln>
-                  <a:noFill/>
-                </a:ln>
-                <a:solidFill>
-                  <a:schemeClr val="bg2"/>
-                </a:solidFill>
-                <a:effectLst/>
-                <a:uLnTx/>
-                <a:uFillTx/>
-                <a:latin typeface="Helvetica 75 Bold" panose="020B0804020202020204" pitchFamily="34" charset="0"/>
-                <a:ea typeface="+mn-ea"/>
-                <a:cs typeface="+mn-cs"/>
-              </a:rPr>
-              <a:t>Orange Restricted</a:t>
-            </a:r>
+            <a:endParaRPr kumimoji="0" lang="en-GB" sz="800" b="0" i="0" u="none" strike="noStrike" kern="1200" cap="none" spc="0" normalizeH="0" baseline="0" dirty="0">
+              <a:ln>
+                <a:noFill/>
+              </a:ln>
+              <a:solidFill>
+                <a:schemeClr val="bg2"/>
+              </a:solidFill>
+              <a:effectLst/>
+              <a:uLnTx/>
+              <a:uFillTx/>
+              <a:latin typeface="Helvetica 75 Bold" panose="020B0804020202020204" pitchFamily="34" charset="0"/>
+              <a:ea typeface="+mn-ea"/>
+              <a:cs typeface="+mn-cs"/>
+            </a:endParaRPr>
           </a:p>
         </p:txBody>
       </p:sp>
@@ -3408,7 +3396,7 @@
         <p:spPr>
           <a:xfrm>
             <a:off x="619545" y="4749146"/>
-            <a:ext cx="900888" cy="123111"/>
+            <a:ext cx="65" cy="123111"/>
           </a:xfrm>
           <a:prstGeom prst="rect">
             <a:avLst/>
@@ -3421,23 +3409,20 @@
           </a:bodyPr>
           <a:lstStyle/>
           <a:p>
-            <a:r>
-              <a:rPr kumimoji="0" lang="en-GB" sz="800" b="0" i="0" u="none" strike="noStrike" kern="1200" cap="none" spc="0" normalizeH="0" baseline="0" dirty="0">
-                <a:ln>
-                  <a:noFill/>
-                </a:ln>
-                <a:solidFill>
-                  <a:schemeClr val="bg2"/>
-                </a:solidFill>
-                <a:effectLst/>
-                <a:uLnTx/>
-                <a:uFillTx/>
-                <a:latin typeface="Helvetica 75 Bold" panose="020B0804020202020204" pitchFamily="34" charset="0"/>
-                <a:ea typeface="+mn-ea"/>
-                <a:cs typeface="+mn-cs"/>
-              </a:rPr>
-              <a:t>Orange Restricted</a:t>
-            </a:r>
+            <a:endParaRPr kumimoji="0" lang="en-GB" sz="800" b="0" i="0" u="none" strike="noStrike" kern="1200" cap="none" spc="0" normalizeH="0" baseline="0" dirty="0">
+              <a:ln>
+                <a:noFill/>
+              </a:ln>
+              <a:solidFill>
+                <a:schemeClr val="bg2"/>
+              </a:solidFill>
+              <a:effectLst/>
+              <a:uLnTx/>
+              <a:uFillTx/>
+              <a:latin typeface="Helvetica 75 Bold" panose="020B0804020202020204" pitchFamily="34" charset="0"/>
+              <a:ea typeface="+mn-ea"/>
+              <a:cs typeface="+mn-cs"/>
+            </a:endParaRPr>
           </a:p>
         </p:txBody>
       </p:sp>
@@ -3601,7 +3586,7 @@
         <p:spPr>
           <a:xfrm>
             <a:off x="619545" y="4749146"/>
-            <a:ext cx="900888" cy="123111"/>
+            <a:ext cx="65" cy="123111"/>
           </a:xfrm>
           <a:prstGeom prst="rect">
             <a:avLst/>
@@ -3614,23 +3599,20 @@
           </a:bodyPr>
           <a:lstStyle/>
           <a:p>
-            <a:r>
-              <a:rPr kumimoji="0" lang="en-GB" sz="800" b="0" i="0" u="none" strike="noStrike" kern="1200" cap="none" spc="0" normalizeH="0" baseline="0" dirty="0">
-                <a:ln>
-                  <a:noFill/>
-                </a:ln>
-                <a:solidFill>
-                  <a:schemeClr val="bg2"/>
-                </a:solidFill>
-                <a:effectLst/>
-                <a:uLnTx/>
-                <a:uFillTx/>
-                <a:latin typeface="Helvetica 75 Bold" panose="020B0804020202020204" pitchFamily="34" charset="0"/>
-                <a:ea typeface="+mn-ea"/>
-                <a:cs typeface="+mn-cs"/>
-              </a:rPr>
-              <a:t>Orange Restricted</a:t>
-            </a:r>
+            <a:endParaRPr kumimoji="0" lang="en-GB" sz="800" b="0" i="0" u="none" strike="noStrike" kern="1200" cap="none" spc="0" normalizeH="0" baseline="0" dirty="0">
+              <a:ln>
+                <a:noFill/>
+              </a:ln>
+              <a:solidFill>
+                <a:schemeClr val="bg2"/>
+              </a:solidFill>
+              <a:effectLst/>
+              <a:uLnTx/>
+              <a:uFillTx/>
+              <a:latin typeface="Helvetica 75 Bold" panose="020B0804020202020204" pitchFamily="34" charset="0"/>
+              <a:ea typeface="+mn-ea"/>
+              <a:cs typeface="+mn-cs"/>
+            </a:endParaRPr>
           </a:p>
         </p:txBody>
       </p:sp>
@@ -4034,6 +4016,59 @@
               <a:latin typeface="Helvetica 75 Bold" panose="020B0804020202020204" pitchFamily="34" charset="0"/>
               <a:ea typeface="+mn-ea"/>
               <a:cs typeface="+mn-cs"/>
+            </a:endParaRPr>
+          </a:p>
+        </p:txBody>
+      </p:sp>
+      <p:sp>
+        <p:nvSpPr>
+          <p:cNvPr id="4" name="MSIPCMContentMarking" descr="{&quot;HashCode&quot;:6032642,&quot;Placement&quot;:&quot;Footer&quot;,&quot;Top&quot;:387.034332,&quot;Left&quot;:320.845978,&quot;SlideWidth&quot;:720,&quot;SlideHeight&quot;:405}">
+            <a:extLst>
+              <a:ext uri="{FF2B5EF4-FFF2-40B4-BE49-F238E27FC236}">
+                <a16:creationId xmlns:a16="http://schemas.microsoft.com/office/drawing/2014/main" id="{2B30B328-1539-4D32-95AD-CE97372C6F59}"/>
+              </a:ext>
+            </a:extLst>
+          </p:cNvPr>
+          <p:cNvSpPr txBox="1"/>
+          <p:nvPr userDrawn="1"/>
+        </p:nvSpPr>
+        <p:spPr>
+          <a:xfrm>
+            <a:off x="4074744" y="4915336"/>
+            <a:ext cx="994512" cy="228163"/>
+          </a:xfrm>
+          <a:prstGeom prst="rect">
+            <a:avLst/>
+          </a:prstGeom>
+        </p:spPr>
+        <p:txBody>
+          <a:bodyPr vert="horz" wrap="square" lIns="0" tIns="0" rIns="0" bIns="0" rtlCol="0" anchor="ctr" anchorCtr="1">
+            <a:spAutoFit/>
+          </a:bodyPr>
+          <a:lstStyle/>
+          <a:p>
+            <a:pPr algn="ctr">
+              <a:spcBef>
+                <a:spcPts val="0"/>
+              </a:spcBef>
+              <a:spcAft>
+                <a:spcPts val="0"/>
+              </a:spcAft>
+            </a:pPr>
+            <a:r>
+              <a:rPr lang="en-US" sz="800">
+                <a:solidFill>
+                  <a:srgbClr val="ED7D31"/>
+                </a:solidFill>
+                <a:latin typeface="Calibri" panose="020F0502020204030204" pitchFamily="34" charset="0"/>
+              </a:rPr>
+              <a:t>Orange Restricted</a:t>
+            </a:r>
+            <a:endParaRPr lang="en-US" sz="800" dirty="0" err="1">
+              <a:solidFill>
+                <a:srgbClr val="ED7D31"/>
+              </a:solidFill>
+              <a:latin typeface="Calibri" panose="020F0502020204030204" pitchFamily="34" charset="0"/>
             </a:endParaRPr>
           </a:p>
         </p:txBody>
@@ -4453,20 +4488,6 @@
               <a:t>Andrei Gabriel Popescu ~ Data Scientist </a:t>
             </a:r>
           </a:p>
-          <a:p>
-            <a:r>
-              <a:rPr lang="en-GB" dirty="0"/>
-              <a:t>Bogdan Marian </a:t>
-            </a:r>
-            <a:r>
-              <a:rPr lang="en-GB" dirty="0" err="1"/>
-              <a:t>Cazan</a:t>
-            </a:r>
-            <a:r>
-              <a:rPr lang="en-GB" dirty="0"/>
-              <a:t> ~ Data Engineer</a:t>
-            </a:r>
-          </a:p>
         </p:txBody>
       </p:sp>
     </p:spTree>
@@ -4588,16 +4609,6 @@
             </a:pPr>
             <a:r>
               <a:rPr lang="en-US" dirty="0"/>
-              <a:t>--- Andrei</a:t>
-            </a:r>
-          </a:p>
-          <a:p>
-            <a:pPr marL="285750" indent="-285750">
-              <a:buFont typeface="Wingdings" panose="05000000000000000000" pitchFamily="2" charset="2"/>
-              <a:buChar char="Ø"/>
-            </a:pPr>
-            <a:r>
-              <a:rPr lang="en-US" dirty="0"/>
               <a:t>Classification </a:t>
             </a:r>
           </a:p>
@@ -4609,23 +4620,6 @@
             <a:r>
               <a:rPr lang="en-US" dirty="0"/>
               <a:t>Code session</a:t>
-            </a:r>
-          </a:p>
-          <a:p>
-            <a:pPr marL="285750" indent="-285750">
-              <a:buFont typeface="Wingdings" panose="05000000000000000000" pitchFamily="2" charset="2"/>
-              <a:buChar char="Ø"/>
-            </a:pPr>
-            <a:endParaRPr lang="en-US" dirty="0"/>
-          </a:p>
-          <a:p>
-            <a:pPr marL="285750" indent="-285750">
-              <a:buFont typeface="Wingdings" panose="05000000000000000000" pitchFamily="2" charset="2"/>
-              <a:buChar char="Ø"/>
-            </a:pPr>
-            <a:r>
-              <a:rPr lang="en-US" dirty="0"/>
-              <a:t>--- Bogdan</a:t>
             </a:r>
           </a:p>
           <a:p>
@@ -6270,8 +6264,8 @@
           </a:p>
         </p:txBody>
       </p:sp>
-      <mc:AlternateContent xmlns:mc="http://schemas.openxmlformats.org/markup-compatibility/2006">
-        <mc:Choice xmlns:a14="http://schemas.microsoft.com/office/drawing/2010/main" Requires="a14">
+      <mc:AlternateContent xmlns:mc="http://schemas.openxmlformats.org/markup-compatibility/2006" xmlns:a14="http://schemas.microsoft.com/office/drawing/2010/main">
+        <mc:Choice Requires="a14">
           <p:sp>
             <p:nvSpPr>
               <p:cNvPr id="3" name="Text Placeholder 2">
@@ -6552,7 +6546,7 @@
             </p:txBody>
           </p:sp>
         </mc:Choice>
-        <mc:Fallback>
+        <mc:Fallback xmlns="">
           <p:sp>
             <p:nvSpPr>
               <p:cNvPr id="3" name="Text Placeholder 2">
@@ -7147,8 +7141,8 @@
           </a:p>
         </p:txBody>
       </p:sp>
-      <mc:AlternateContent xmlns:mc="http://schemas.openxmlformats.org/markup-compatibility/2006">
-        <mc:Choice xmlns:a14="http://schemas.microsoft.com/office/drawing/2010/main" Requires="a14">
+      <mc:AlternateContent xmlns:mc="http://schemas.openxmlformats.org/markup-compatibility/2006" xmlns:a14="http://schemas.microsoft.com/office/drawing/2010/main">
+        <mc:Choice Requires="a14">
           <p:sp>
             <p:nvSpPr>
               <p:cNvPr id="3" name="Text Placeholder 2">
@@ -7978,7 +7972,7 @@
             </p:txBody>
           </p:sp>
         </mc:Choice>
-        <mc:Fallback>
+        <mc:Fallback xmlns="">
           <p:sp>
             <p:nvSpPr>
               <p:cNvPr id="3" name="Text Placeholder 2">
@@ -9247,9 +9241,12 @@
 </file>
 
 <file path=customXml/item1.xml><?xml version="1.0" encoding="utf-8"?>
-<p:properties xmlns:p="http://schemas.microsoft.com/office/2006/metadata/properties" xmlns:xsi="http://www.w3.org/2001/XMLSchema-instance" xmlns:pc="http://schemas.microsoft.com/office/infopath/2007/PartnerControls">
-  <documentManagement/>
-</p:properties>
+<?mso-contentType ?>
+<FormTemplates xmlns="http://schemas.microsoft.com/sharepoint/v3/contenttype/forms">
+  <Display>DocumentLibraryForm</Display>
+  <Edit>DocumentLibraryForm</Edit>
+  <New>DocumentLibraryForm</New>
+</FormTemplates>
 </file>
 
 <file path=customXml/item2.xml><?xml version="1.0" encoding="utf-8"?>
@@ -9367,25 +9364,15 @@
 </file>
 
 <file path=customXml/item3.xml><?xml version="1.0" encoding="utf-8"?>
-<?mso-contentType ?>
-<FormTemplates xmlns="http://schemas.microsoft.com/sharepoint/v3/contenttype/forms">
-  <Display>DocumentLibraryForm</Display>
-  <Edit>DocumentLibraryForm</Edit>
-  <New>DocumentLibraryForm</New>
-</FormTemplates>
+<p:properties xmlns:p="http://schemas.microsoft.com/office/2006/metadata/properties" xmlns:xsi="http://www.w3.org/2001/XMLSchema-instance" xmlns:pc="http://schemas.microsoft.com/office/infopath/2007/PartnerControls">
+  <documentManagement/>
+</p:properties>
 </file>
 
 <file path=customXml/itemProps1.xml><?xml version="1.0" encoding="utf-8"?>
-<ds:datastoreItem xmlns:ds="http://schemas.openxmlformats.org/officeDocument/2006/customXml" ds:itemID="{FF149A3D-0E05-43C4-911C-4AD1CDEB0FDE}">
+<ds:datastoreItem xmlns:ds="http://schemas.openxmlformats.org/officeDocument/2006/customXml" ds:itemID="{492B459E-7FFE-4352-AABB-8A0EF8F04A92}">
   <ds:schemaRefs>
-    <ds:schemaRef ds:uri="http://purl.org/dc/terms/"/>
-    <ds:schemaRef ds:uri="http://schemas.microsoft.com/office/infopath/2007/PartnerControls"/>
-    <ds:schemaRef ds:uri="http://schemas.microsoft.com/office/2006/metadata/properties"/>
-    <ds:schemaRef ds:uri="http://purl.org/dc/dcmitype/"/>
-    <ds:schemaRef ds:uri="http://purl.org/dc/elements/1.1/"/>
-    <ds:schemaRef ds:uri="http://schemas.microsoft.com/office/2006/documentManagement/types"/>
-    <ds:schemaRef ds:uri="http://www.w3.org/XML/1998/namespace"/>
-    <ds:schemaRef ds:uri="http://schemas.openxmlformats.org/package/2006/metadata/core-properties"/>
+    <ds:schemaRef ds:uri="http://schemas.microsoft.com/sharepoint/v3/contenttype/forms"/>
   </ds:schemaRefs>
 </ds:datastoreItem>
 </file>
@@ -9407,9 +9394,16 @@
 </file>
 
 <file path=customXml/itemProps3.xml><?xml version="1.0" encoding="utf-8"?>
-<ds:datastoreItem xmlns:ds="http://schemas.openxmlformats.org/officeDocument/2006/customXml" ds:itemID="{492B459E-7FFE-4352-AABB-8A0EF8F04A92}">
+<ds:datastoreItem xmlns:ds="http://schemas.openxmlformats.org/officeDocument/2006/customXml" ds:itemID="{FF149A3D-0E05-43C4-911C-4AD1CDEB0FDE}">
   <ds:schemaRefs>
-    <ds:schemaRef ds:uri="http://schemas.microsoft.com/sharepoint/v3/contenttype/forms"/>
+    <ds:schemaRef ds:uri="http://purl.org/dc/terms/"/>
+    <ds:schemaRef ds:uri="http://schemas.microsoft.com/office/infopath/2007/PartnerControls"/>
+    <ds:schemaRef ds:uri="http://schemas.microsoft.com/office/2006/metadata/properties"/>
+    <ds:schemaRef ds:uri="http://purl.org/dc/dcmitype/"/>
+    <ds:schemaRef ds:uri="http://purl.org/dc/elements/1.1/"/>
+    <ds:schemaRef ds:uri="http://schemas.microsoft.com/office/2006/documentManagement/types"/>
+    <ds:schemaRef ds:uri="http://www.w3.org/XML/1998/namespace"/>
+    <ds:schemaRef ds:uri="http://schemas.openxmlformats.org/package/2006/metadata/core-properties"/>
   </ds:schemaRefs>
 </ds:datastoreItem>
 </file>
</xml_diff>